<commit_message>
update the schematic diagram
</commit_message>
<xml_diff>
--- a/doc/papers/CdTeSensor/figures/H2_BeamSchematicDiagram.pptx
+++ b/doc/papers/CdTeSensor/figures/H2_BeamSchematicDiagram.pptx
@@ -288,7 +288,7 @@
           <a:p>
             <a:fld id="{70DE82B7-77BA-B146-8E9D-17DD00EC65FC}" type="datetimeFigureOut">
               <a:rPr lang="en-US" smtClean="0"/>
-              <a:t>11/18/16</a:t>
+              <a:t>12/3/16</a:t>
             </a:fld>
             <a:endParaRPr lang="en-US"/>
           </a:p>
@@ -458,7 +458,7 @@
           <a:p>
             <a:fld id="{70DE82B7-77BA-B146-8E9D-17DD00EC65FC}" type="datetimeFigureOut">
               <a:rPr lang="en-US" smtClean="0"/>
-              <a:t>11/18/16</a:t>
+              <a:t>12/3/16</a:t>
             </a:fld>
             <a:endParaRPr lang="en-US"/>
           </a:p>
@@ -638,7 +638,7 @@
           <a:p>
             <a:fld id="{70DE82B7-77BA-B146-8E9D-17DD00EC65FC}" type="datetimeFigureOut">
               <a:rPr lang="en-US" smtClean="0"/>
-              <a:t>11/18/16</a:t>
+              <a:t>12/3/16</a:t>
             </a:fld>
             <a:endParaRPr lang="en-US"/>
           </a:p>
@@ -808,7 +808,7 @@
           <a:p>
             <a:fld id="{70DE82B7-77BA-B146-8E9D-17DD00EC65FC}" type="datetimeFigureOut">
               <a:rPr lang="en-US" smtClean="0"/>
-              <a:t>11/18/16</a:t>
+              <a:t>12/3/16</a:t>
             </a:fld>
             <a:endParaRPr lang="en-US"/>
           </a:p>
@@ -1054,7 +1054,7 @@
           <a:p>
             <a:fld id="{70DE82B7-77BA-B146-8E9D-17DD00EC65FC}" type="datetimeFigureOut">
               <a:rPr lang="en-US" smtClean="0"/>
-              <a:t>11/18/16</a:t>
+              <a:t>12/3/16</a:t>
             </a:fld>
             <a:endParaRPr lang="en-US"/>
           </a:p>
@@ -1342,7 +1342,7 @@
           <a:p>
             <a:fld id="{70DE82B7-77BA-B146-8E9D-17DD00EC65FC}" type="datetimeFigureOut">
               <a:rPr lang="en-US" smtClean="0"/>
-              <a:t>11/18/16</a:t>
+              <a:t>12/3/16</a:t>
             </a:fld>
             <a:endParaRPr lang="en-US"/>
           </a:p>
@@ -1764,7 +1764,7 @@
           <a:p>
             <a:fld id="{70DE82B7-77BA-B146-8E9D-17DD00EC65FC}" type="datetimeFigureOut">
               <a:rPr lang="en-US" smtClean="0"/>
-              <a:t>11/18/16</a:t>
+              <a:t>12/3/16</a:t>
             </a:fld>
             <a:endParaRPr lang="en-US"/>
           </a:p>
@@ -1882,7 +1882,7 @@
           <a:p>
             <a:fld id="{70DE82B7-77BA-B146-8E9D-17DD00EC65FC}" type="datetimeFigureOut">
               <a:rPr lang="en-US" smtClean="0"/>
-              <a:t>11/18/16</a:t>
+              <a:t>12/3/16</a:t>
             </a:fld>
             <a:endParaRPr lang="en-US"/>
           </a:p>
@@ -1977,7 +1977,7 @@
           <a:p>
             <a:fld id="{70DE82B7-77BA-B146-8E9D-17DD00EC65FC}" type="datetimeFigureOut">
               <a:rPr lang="en-US" smtClean="0"/>
-              <a:t>11/18/16</a:t>
+              <a:t>12/3/16</a:t>
             </a:fld>
             <a:endParaRPr lang="en-US"/>
           </a:p>
@@ -2254,7 +2254,7 @@
           <a:p>
             <a:fld id="{70DE82B7-77BA-B146-8E9D-17DD00EC65FC}" type="datetimeFigureOut">
               <a:rPr lang="en-US" smtClean="0"/>
-              <a:t>11/18/16</a:t>
+              <a:t>12/3/16</a:t>
             </a:fld>
             <a:endParaRPr lang="en-US"/>
           </a:p>
@@ -2507,7 +2507,7 @@
           <a:p>
             <a:fld id="{70DE82B7-77BA-B146-8E9D-17DD00EC65FC}" type="datetimeFigureOut">
               <a:rPr lang="en-US" smtClean="0"/>
-              <a:t>11/18/16</a:t>
+              <a:t>12/3/16</a:t>
             </a:fld>
             <a:endParaRPr lang="en-US"/>
           </a:p>
@@ -2720,7 +2720,7 @@
           <a:p>
             <a:fld id="{70DE82B7-77BA-B146-8E9D-17DD00EC65FC}" type="datetimeFigureOut">
               <a:rPr lang="en-US" smtClean="0"/>
-              <a:t>11/18/16</a:t>
+              <a:t>12/3/16</a:t>
             </a:fld>
             <a:endParaRPr lang="en-US"/>
           </a:p>
@@ -3123,15 +3123,7 @@
                   <a:srgbClr val="FF0000"/>
                 </a:solidFill>
               </a:rPr>
-              <a:t>Electron </a:t>
-            </a:r>
-            <a:r>
-              <a:rPr lang="en-US" sz="4000" b="1" dirty="0" smtClean="0">
-                <a:solidFill>
-                  <a:srgbClr val="FF0000"/>
-                </a:solidFill>
-              </a:rPr>
-              <a:t>Beam @ H2</a:t>
+              <a:t>Electron Beam @ H2</a:t>
             </a:r>
             <a:endParaRPr lang="en-US" sz="4000" b="1" dirty="0">
               <a:solidFill>
@@ -3400,7 +3392,7 @@
         </p:nvSpPr>
         <p:spPr>
           <a:xfrm>
-            <a:off x="4945884" y="1947745"/>
+            <a:off x="4961561" y="3173168"/>
             <a:ext cx="1356083" cy="827301"/>
           </a:xfrm>
           <a:prstGeom prst="rect">
@@ -3613,9 +3605,9 @@
           <p:nvPr/>
         </p:nvCxnSpPr>
         <p:spPr>
-          <a:xfrm flipH="1">
-            <a:off x="4354428" y="2382911"/>
-            <a:ext cx="460537" cy="254868"/>
+          <a:xfrm flipH="1" flipV="1">
+            <a:off x="4354429" y="3033236"/>
+            <a:ext cx="1054594" cy="139933"/>
           </a:xfrm>
           <a:prstGeom prst="straightConnector1">
             <a:avLst/>
@@ -3727,8 +3719,8 @@
         </p:nvSpPr>
         <p:spPr>
           <a:xfrm>
-            <a:off x="4619126" y="975530"/>
-            <a:ext cx="1557159" cy="827301"/>
+            <a:off x="4271897" y="1103762"/>
+            <a:ext cx="2128903" cy="1196633"/>
           </a:xfrm>
           <a:prstGeom prst="rect">
             <a:avLst/>
@@ -3736,10 +3728,21 @@
           <a:noFill/>
         </p:spPr>
         <p:txBody>
-          <a:bodyPr wrap="none" lIns="87780" tIns="43890" rIns="87780" bIns="43890" rtlCol="0">
+          <a:bodyPr wrap="square" lIns="87780" tIns="43890" rIns="87780" bIns="43890" rtlCol="0">
             <a:spAutoFit/>
           </a:bodyPr>
           <a:lstStyle/>
+          <a:p>
+            <a:pPr algn="ctr"/>
+            <a:r>
+              <a:rPr lang="en-US" sz="2400" b="1" dirty="0" smtClean="0">
+                <a:solidFill>
+                  <a:srgbClr val="FF6600"/>
+                </a:solidFill>
+              </a:rPr>
+              <a:t>4 cm x 4 cm</a:t>
+            </a:r>
+          </a:p>
           <a:p>
             <a:pPr algn="ctr"/>
             <a:r>
@@ -3750,6 +3753,11 @@
               </a:rPr>
               <a:t>Scintillator</a:t>
             </a:r>
+            <a:endParaRPr lang="en-US" sz="2400" b="1" dirty="0" smtClean="0">
+              <a:solidFill>
+                <a:srgbClr val="FF6600"/>
+              </a:solidFill>
+            </a:endParaRPr>
           </a:p>
           <a:p>
             <a:pPr algn="ctr"/>
@@ -3772,15 +3780,13 @@
       <p:cxnSp>
         <p:nvCxnSpPr>
           <p:cNvPr id="24" name="Straight Arrow Connector 23"/>
-          <p:cNvCxnSpPr>
-            <a:stCxn id="21" idx="1"/>
-          </p:cNvCxnSpPr>
+          <p:cNvCxnSpPr/>
           <p:nvPr/>
         </p:nvCxnSpPr>
         <p:spPr>
           <a:xfrm flipH="1">
-            <a:off x="3548182" y="1389181"/>
-            <a:ext cx="1070944" cy="312898"/>
+            <a:off x="3511381" y="1702079"/>
+            <a:ext cx="1001118" cy="128232"/>
           </a:xfrm>
           <a:prstGeom prst="straightConnector1">
             <a:avLst/>

</xml_diff>